<commit_message>
setting up frontend for search results
</commit_message>
<xml_diff>
--- a/swewars.pptx
+++ b/swewars.pptx
@@ -117,6 +117,11 @@
       </a:defRPr>
     </a:lvl9pPr>
   </p:defaultTextStyle>
+  <p:extLst>
+    <p:ext uri="{EFAFB233-063F-42B5-8137-9DF3F51BA10A}">
+      <p15:sldGuideLst xmlns:p15="http://schemas.microsoft.com/office/powerpoint/2012/main"/>
+    </p:ext>
+  </p:extLst>
 </p:presentation>
 </file>
 
@@ -6470,6 +6475,14 @@
   <p:clrMapOvr>
     <a:masterClrMapping/>
   </p:clrMapOvr>
+  <mc:AlternateContent xmlns:mc="http://schemas.openxmlformats.org/markup-compatibility/2006">
+    <mc:Choice xmlns:p14="http://schemas.microsoft.com/office/powerpoint/2010/main" Requires="p14">
+      <p:transition p14:dur="0"/>
+    </mc:Choice>
+    <mc:Fallback>
+      <p:transition/>
+    </mc:Fallback>
+  </mc:AlternateContent>
   <p:timing>
     <p:tnLst>
       <p:par>

</xml_diff>

<commit_message>
added some ppt stuff
</commit_message>
<xml_diff>
--- a/swewars.pptx
+++ b/swewars.pptx
@@ -13,10 +13,11 @@
     <p:sldId id="273" r:id="rId7"/>
     <p:sldId id="264" r:id="rId8"/>
     <p:sldId id="274" r:id="rId9"/>
-    <p:sldId id="263" r:id="rId10"/>
-    <p:sldId id="266" r:id="rId11"/>
-    <p:sldId id="267" r:id="rId12"/>
-    <p:sldId id="269" r:id="rId13"/>
+    <p:sldId id="275" r:id="rId10"/>
+    <p:sldId id="263" r:id="rId11"/>
+    <p:sldId id="266" r:id="rId12"/>
+    <p:sldId id="267" r:id="rId13"/>
+    <p:sldId id="269" r:id="rId14"/>
   </p:sldIdLst>
   <p:sldSz cx="12192000" cy="6858000"/>
   <p:notesSz cx="6858000" cy="9144000"/>
@@ -144,10 +145,10 @@
           <c:layoutTarget val="inner"/>
           <c:xMode val="edge"/>
           <c:yMode val="edge"/>
-          <c:x val="7.6615381560029186E-2"/>
-          <c:y val="0"/>
-          <c:w val="0.90026083692208092"/>
-          <c:h val="0.93615721502563531"/>
+          <c:x val="0.0766153815600292"/>
+          <c:y val="0.0"/>
+          <c:w val="0.900260836922081"/>
+          <c:h val="0.936157215025635"/>
         </c:manualLayout>
       </c:layout>
       <c:barChart>
@@ -208,19 +209,19 @@
                 <c:formatCode>General</c:formatCode>
                 <c:ptCount val="5"/>
                 <c:pt idx="0">
-                  <c:v>23</c:v>
+                  <c:v>23.0</c:v>
                 </c:pt>
                 <c:pt idx="1">
-                  <c:v>3</c:v>
+                  <c:v>3.0</c:v>
                 </c:pt>
                 <c:pt idx="2">
-                  <c:v>2</c:v>
+                  <c:v>2.0</c:v>
                 </c:pt>
                 <c:pt idx="3">
-                  <c:v>9</c:v>
+                  <c:v>9.0</c:v>
                 </c:pt>
                 <c:pt idx="4">
-                  <c:v>13</c:v>
+                  <c:v>13.0</c:v>
                 </c:pt>
               </c:numCache>
             </c:numRef>
@@ -280,19 +281,19 @@
                 <c:formatCode>General</c:formatCode>
                 <c:ptCount val="5"/>
                 <c:pt idx="0">
-                  <c:v>5</c:v>
+                  <c:v>5.0</c:v>
                 </c:pt>
                 <c:pt idx="1">
-                  <c:v>3</c:v>
+                  <c:v>3.0</c:v>
                 </c:pt>
                 <c:pt idx="2">
-                  <c:v>2</c:v>
+                  <c:v>2.0</c:v>
                 </c:pt>
                 <c:pt idx="3">
-                  <c:v>38</c:v>
+                  <c:v>38.0</c:v>
                 </c:pt>
                 <c:pt idx="4">
-                  <c:v>4</c:v>
+                  <c:v>4.0</c:v>
                 </c:pt>
               </c:numCache>
             </c:numRef>
@@ -352,19 +353,19 @@
                 <c:formatCode>General</c:formatCode>
                 <c:ptCount val="5"/>
                 <c:pt idx="0">
-                  <c:v>89</c:v>
+                  <c:v>89.0</c:v>
                 </c:pt>
                 <c:pt idx="1">
-                  <c:v>85</c:v>
+                  <c:v>85.0</c:v>
                 </c:pt>
                 <c:pt idx="2">
-                  <c:v>32</c:v>
+                  <c:v>32.0</c:v>
                 </c:pt>
                 <c:pt idx="3">
-                  <c:v>49</c:v>
+                  <c:v>49.0</c:v>
                 </c:pt>
                 <c:pt idx="4">
-                  <c:v>15</c:v>
+                  <c:v>15.0</c:v>
                 </c:pt>
               </c:numCache>
             </c:numRef>
@@ -379,11 +380,11 @@
           <c:showBubbleSize val="0"/>
         </c:dLbls>
         <c:gapWidth val="182"/>
-        <c:axId val="2832960"/>
-        <c:axId val="2826976"/>
+        <c:axId val="2120569664"/>
+        <c:axId val="2108892336"/>
       </c:barChart>
       <c:catAx>
-        <c:axId val="2832960"/>
+        <c:axId val="2120569664"/>
         <c:scaling>
           <c:orientation val="minMax"/>
         </c:scaling>
@@ -426,7 +427,7 @@
             <a:endParaRPr lang="en-US"/>
           </a:p>
         </c:txPr>
-        <c:crossAx val="2826976"/>
+        <c:crossAx val="2108892336"/>
         <c:crosses val="autoZero"/>
         <c:auto val="1"/>
         <c:lblAlgn val="ctr"/>
@@ -434,7 +435,7 @@
         <c:noMultiLvlLbl val="0"/>
       </c:catAx>
       <c:valAx>
-        <c:axId val="2826976"/>
+        <c:axId val="2108892336"/>
         <c:scaling>
           <c:orientation val="minMax"/>
         </c:scaling>
@@ -471,7 +472,7 @@
             <a:endParaRPr lang="en-US"/>
           </a:p>
         </c:txPr>
-        <c:crossAx val="2832960"/>
+        <c:crossAx val="2120569664"/>
         <c:crosses val="autoZero"/>
         <c:crossBetween val="between"/>
       </c:valAx>
@@ -485,6 +486,7 @@
     </c:plotArea>
     <c:legend>
       <c:legendPos val="tr"/>
+      <c:layout/>
       <c:overlay val="1"/>
       <c:spPr>
         <a:noFill/>
@@ -1422,7 +1424,7 @@
             <a:fld id="{B61BEF0D-F0BB-DE4B-95CE-6DB70DBA9567}" type="datetimeFigureOut">
               <a:rPr lang="en-US" smtClean="0"/>
               <a:pPr/>
-              <a:t>4/29/2016</a:t>
+              <a:t>5/1/16</a:t>
             </a:fld>
             <a:endParaRPr lang="en-US" dirty="0"/>
           </a:p>
@@ -2512,7 +2514,7 @@
             <a:fld id="{B61BEF0D-F0BB-DE4B-95CE-6DB70DBA9567}" type="datetimeFigureOut">
               <a:rPr lang="en-US" smtClean="0"/>
               <a:pPr/>
-              <a:t>4/29/2016</a:t>
+              <a:t>5/1/16</a:t>
             </a:fld>
             <a:endParaRPr lang="en-US" dirty="0"/>
           </a:p>
@@ -3494,7 +3496,7 @@
             <a:fld id="{B61BEF0D-F0BB-DE4B-95CE-6DB70DBA9567}" type="datetimeFigureOut">
               <a:rPr lang="en-US" smtClean="0"/>
               <a:pPr/>
-              <a:t>4/29/2016</a:t>
+              <a:t>5/1/16</a:t>
             </a:fld>
             <a:endParaRPr lang="en-US" dirty="0"/>
           </a:p>
@@ -4630,7 +4632,7 @@
             <a:fld id="{B61BEF0D-F0BB-DE4B-95CE-6DB70DBA9567}" type="datetimeFigureOut">
               <a:rPr lang="en-US" smtClean="0"/>
               <a:pPr/>
-              <a:t>4/29/2016</a:t>
+              <a:t>5/1/16</a:t>
             </a:fld>
             <a:endParaRPr lang="en-US" dirty="0"/>
           </a:p>
@@ -5665,7 +5667,7 @@
             <a:fld id="{B61BEF0D-F0BB-DE4B-95CE-6DB70DBA9567}" type="datetimeFigureOut">
               <a:rPr lang="en-US" smtClean="0"/>
               <a:pPr/>
-              <a:t>4/29/2016</a:t>
+              <a:t>5/1/16</a:t>
             </a:fld>
             <a:endParaRPr lang="en-US" dirty="0"/>
           </a:p>
@@ -6327,7 +6329,7 @@
             <a:fld id="{B61BEF0D-F0BB-DE4B-95CE-6DB70DBA9567}" type="datetimeFigureOut">
               <a:rPr lang="en-US" smtClean="0"/>
               <a:pPr/>
-              <a:t>4/29/2016</a:t>
+              <a:t>5/1/16</a:t>
             </a:fld>
             <a:endParaRPr lang="en-US" dirty="0"/>
           </a:p>
@@ -7190,7 +7192,7 @@
             <a:fld id="{B61BEF0D-F0BB-DE4B-95CE-6DB70DBA9567}" type="datetimeFigureOut">
               <a:rPr lang="en-US" smtClean="0"/>
               <a:pPr/>
-              <a:t>4/29/2016</a:t>
+              <a:t>5/1/16</a:t>
             </a:fld>
             <a:endParaRPr lang="en-US" dirty="0"/>
           </a:p>
@@ -7382,7 +7384,7 @@
             <a:fld id="{B61BEF0D-F0BB-DE4B-95CE-6DB70DBA9567}" type="datetimeFigureOut">
               <a:rPr lang="en-US" smtClean="0"/>
               <a:pPr/>
-              <a:t>4/29/2016</a:t>
+              <a:t>5/1/16</a:t>
             </a:fld>
             <a:endParaRPr lang="en-US" dirty="0"/>
           </a:p>
@@ -8356,7 +8358,7 @@
             <a:fld id="{B61BEF0D-F0BB-DE4B-95CE-6DB70DBA9567}" type="datetimeFigureOut">
               <a:rPr lang="en-US" smtClean="0"/>
               <a:pPr/>
-              <a:t>4/29/2016</a:t>
+              <a:t>5/1/16</a:t>
             </a:fld>
             <a:endParaRPr lang="en-US" dirty="0"/>
           </a:p>
@@ -8569,7 +8571,7 @@
             <a:fld id="{B61BEF0D-F0BB-DE4B-95CE-6DB70DBA9567}" type="datetimeFigureOut">
               <a:rPr lang="en-US" smtClean="0"/>
               <a:pPr/>
-              <a:t>4/29/2016</a:t>
+              <a:t>5/1/16</a:t>
             </a:fld>
             <a:endParaRPr lang="en-US" dirty="0"/>
           </a:p>
@@ -9605,7 +9607,7 @@
             <a:fld id="{B61BEF0D-F0BB-DE4B-95CE-6DB70DBA9567}" type="datetimeFigureOut">
               <a:rPr lang="en-US" smtClean="0"/>
               <a:pPr/>
-              <a:t>4/29/2016</a:t>
+              <a:t>5/1/16</a:t>
             </a:fld>
             <a:endParaRPr lang="en-US" dirty="0"/>
           </a:p>
@@ -9879,7 +9881,7 @@
             <a:fld id="{B61BEF0D-F0BB-DE4B-95CE-6DB70DBA9567}" type="datetimeFigureOut">
               <a:rPr lang="en-US" smtClean="0"/>
               <a:pPr/>
-              <a:t>4/29/2016</a:t>
+              <a:t>5/1/16</a:t>
             </a:fld>
             <a:endParaRPr lang="en-US" dirty="0"/>
           </a:p>
@@ -10291,7 +10293,7 @@
             <a:fld id="{B61BEF0D-F0BB-DE4B-95CE-6DB70DBA9567}" type="datetimeFigureOut">
               <a:rPr lang="en-US" smtClean="0"/>
               <a:pPr/>
-              <a:t>4/29/2016</a:t>
+              <a:t>5/1/16</a:t>
             </a:fld>
             <a:endParaRPr lang="en-US" dirty="0"/>
           </a:p>
@@ -10420,7 +10422,7 @@
             <a:fld id="{B61BEF0D-F0BB-DE4B-95CE-6DB70DBA9567}" type="datetimeFigureOut">
               <a:rPr lang="en-US" smtClean="0"/>
               <a:pPr/>
-              <a:t>4/29/2016</a:t>
+              <a:t>5/1/16</a:t>
             </a:fld>
             <a:endParaRPr lang="en-US" dirty="0"/>
           </a:p>
@@ -10517,7 +10519,7 @@
             <a:fld id="{B61BEF0D-F0BB-DE4B-95CE-6DB70DBA9567}" type="datetimeFigureOut">
               <a:rPr lang="en-US" smtClean="0"/>
               <a:pPr/>
-              <a:t>4/29/2016</a:t>
+              <a:t>5/1/16</a:t>
             </a:fld>
             <a:endParaRPr lang="en-US" dirty="0"/>
           </a:p>
@@ -11600,7 +11602,7 @@
             <a:fld id="{B61BEF0D-F0BB-DE4B-95CE-6DB70DBA9567}" type="datetimeFigureOut">
               <a:rPr lang="en-US" smtClean="0"/>
               <a:pPr/>
-              <a:t>4/29/2016</a:t>
+              <a:t>5/1/16</a:t>
             </a:fld>
             <a:endParaRPr lang="en-US" dirty="0"/>
           </a:p>
@@ -12710,7 +12712,7 @@
             <a:fld id="{B61BEF0D-F0BB-DE4B-95CE-6DB70DBA9567}" type="datetimeFigureOut">
               <a:rPr lang="en-US" smtClean="0"/>
               <a:pPr/>
-              <a:t>4/29/2016</a:t>
+              <a:t>5/1/16</a:t>
             </a:fld>
             <a:endParaRPr lang="en-US" dirty="0"/>
           </a:p>
@@ -13709,7 +13711,7 @@
             <a:fld id="{B61BEF0D-F0BB-DE4B-95CE-6DB70DBA9567}" type="datetimeFigureOut">
               <a:rPr lang="en-US" smtClean="0"/>
               <a:pPr/>
-              <a:t>4/29/2016</a:t>
+              <a:t>5/1/16</a:t>
             </a:fld>
             <a:endParaRPr lang="en-US" dirty="0"/>
           </a:p>
@@ -14369,112 +14371,46 @@
           <a:p>
             <a:r>
               <a:rPr lang="en-US" dirty="0" smtClean="0"/>
-              <a:t>Return Of the API Critique</a:t>
+              <a:t>Individual</a:t>
+            </a:r>
+            <a:r>
+              <a:rPr lang="en-US" dirty="0" smtClean="0"/>
+              <a:t> </a:t>
+            </a:r>
+            <a:r>
+              <a:rPr lang="en-US" dirty="0" smtClean="0"/>
+              <a:t>Statistics</a:t>
             </a:r>
             <a:endParaRPr lang="en-US" dirty="0"/>
           </a:p>
         </p:txBody>
       </p:sp>
-      <p:sp>
-        <p:nvSpPr>
-          <p:cNvPr id="3" name="Content Placeholder 2"/>
-          <p:cNvSpPr>
-            <a:spLocks noGrp="1"/>
-          </p:cNvSpPr>
+      <p:graphicFrame>
+        <p:nvGraphicFramePr>
+          <p:cNvPr id="7" name="Chart 6"/>
+          <p:cNvGraphicFramePr/>
           <p:nvPr>
-            <p:ph idx="1"/>
+            <p:extLst>
+              <p:ext uri="{D42A27DB-BD31-4B8C-83A1-F6EECF244321}">
+                <p14:modId xmlns:p14="http://schemas.microsoft.com/office/powerpoint/2010/main" val="2299011358"/>
+              </p:ext>
+            </p:extLst>
           </p:nvPr>
-        </p:nvSpPr>
-        <p:spPr>
-          <a:xfrm>
-            <a:off x="1154954" y="2603500"/>
-            <a:ext cx="8825659" cy="3966982"/>
-          </a:xfrm>
-        </p:spPr>
-        <p:txBody>
-          <a:bodyPr>
-            <a:normAutofit fontScale="92500" lnSpcReduction="10000"/>
-          </a:bodyPr>
-          <a:lstStyle/>
-          <a:p>
-            <a:r>
-              <a:rPr lang="en-US" b="1" dirty="0" smtClean="0"/>
-              <a:t>What did we do well?</a:t>
-            </a:r>
-          </a:p>
-          <a:p>
-            <a:pPr lvl="1"/>
-            <a:r>
-              <a:rPr lang="en-US" dirty="0" smtClean="0"/>
-              <a:t>Theme design</a:t>
-            </a:r>
-          </a:p>
-          <a:p>
-            <a:r>
-              <a:rPr lang="en-US" b="1" dirty="0" smtClean="0"/>
-              <a:t>What did we learn?</a:t>
-            </a:r>
-          </a:p>
-          <a:p>
-            <a:pPr lvl="1"/>
-            <a:r>
-              <a:rPr lang="en-US" dirty="0" smtClean="0"/>
-              <a:t>Team bonding</a:t>
-            </a:r>
-          </a:p>
-          <a:p>
-            <a:r>
-              <a:rPr lang="en-US" b="1" dirty="0" smtClean="0"/>
-              <a:t>What can we do better?</a:t>
-            </a:r>
-          </a:p>
-          <a:p>
-            <a:pPr lvl="1"/>
-            <a:r>
-              <a:rPr lang="en-US" dirty="0" smtClean="0"/>
-              <a:t>Not have all attributes as strings</a:t>
-            </a:r>
-          </a:p>
-          <a:p>
-            <a:pPr lvl="1"/>
-            <a:r>
-              <a:rPr lang="en-US" dirty="0" smtClean="0"/>
-              <a:t>Not include descriptions in search?</a:t>
-            </a:r>
-          </a:p>
-          <a:p>
-            <a:r>
-              <a:rPr lang="en-US" b="1" dirty="0" smtClean="0"/>
-              <a:t>What puzzles us?</a:t>
-            </a:r>
-          </a:p>
-          <a:p>
-            <a:pPr lvl="1"/>
-            <a:r>
-              <a:rPr lang="en-US" dirty="0" smtClean="0"/>
-              <a:t>Docker</a:t>
-            </a:r>
-          </a:p>
-          <a:p>
-            <a:pPr lvl="1"/>
-            <a:r>
-              <a:rPr lang="en-US" dirty="0" smtClean="0"/>
-              <a:t>Search incompatibilities</a:t>
-            </a:r>
-          </a:p>
-          <a:p>
-            <a:pPr lvl="1"/>
-            <a:r>
-              <a:rPr lang="en-US" dirty="0" smtClean="0"/>
-              <a:t>Pagination</a:t>
-            </a:r>
-          </a:p>
-        </p:txBody>
-      </p:sp>
+        </p:nvGraphicFramePr>
+        <p:xfrm>
+          <a:off x="1694767" y="2039930"/>
+          <a:ext cx="8886820" cy="4818070"/>
+        </p:xfrm>
+        <a:graphic>
+          <a:graphicData uri="http://schemas.openxmlformats.org/drawingml/2006/chart">
+            <c:chart xmlns:c="http://schemas.openxmlformats.org/drawingml/2006/chart" xmlns:r="http://schemas.openxmlformats.org/officeDocument/2006/relationships" r:id="rId2"/>
+          </a:graphicData>
+        </a:graphic>
+      </p:graphicFrame>
     </p:spTree>
     <p:extLst>
       <p:ext uri="{BB962C8B-B14F-4D97-AF65-F5344CB8AC3E}">
-        <p14:creationId xmlns:p14="http://schemas.microsoft.com/office/powerpoint/2010/main" val="1581070012"/>
+        <p14:creationId xmlns:p14="http://schemas.microsoft.com/office/powerpoint/2010/main" val="1027931853"/>
       </p:ext>
     </p:extLst>
   </p:cSld>
@@ -14524,12 +14460,8 @@
           <a:lstStyle/>
           <a:p>
             <a:r>
-              <a:rPr lang="en-US" dirty="0" err="1" smtClean="0"/>
-              <a:t>CompRo</a:t>
-            </a:r>
-            <a:r>
               <a:rPr lang="en-US" dirty="0" smtClean="0"/>
-              <a:t> DB Critique</a:t>
+              <a:t>Return Of the API Critique</a:t>
             </a:r>
             <a:endParaRPr lang="en-US" dirty="0"/>
           </a:p>
@@ -14545,10 +14477,216 @@
             <p:ph idx="1"/>
           </p:nvPr>
         </p:nvSpPr>
+        <p:spPr>
+          <a:xfrm>
+            <a:off x="1154954" y="2603500"/>
+            <a:ext cx="8825659" cy="3966982"/>
+          </a:xfrm>
+        </p:spPr>
+        <p:txBody>
+          <a:bodyPr numCol="2">
+            <a:normAutofit/>
+          </a:bodyPr>
+          <a:lstStyle/>
+          <a:p>
+            <a:r>
+              <a:rPr lang="en-US" b="1" dirty="0" smtClean="0"/>
+              <a:t>What did we do well?</a:t>
+            </a:r>
+          </a:p>
+          <a:p>
+            <a:pPr lvl="1"/>
+            <a:r>
+              <a:rPr lang="en-US" dirty="0" smtClean="0"/>
+              <a:t>UI</a:t>
+            </a:r>
+          </a:p>
+          <a:p>
+            <a:pPr lvl="1"/>
+            <a:r>
+              <a:rPr lang="en-US" dirty="0" smtClean="0"/>
+              <a:t>Clean API calls</a:t>
+            </a:r>
+          </a:p>
+          <a:p>
+            <a:pPr lvl="1"/>
+            <a:r>
+              <a:rPr lang="en-US" dirty="0" smtClean="0"/>
+              <a:t>Database design</a:t>
+            </a:r>
+            <a:endParaRPr lang="en-US" dirty="0" smtClean="0"/>
+          </a:p>
+          <a:p>
+            <a:r>
+              <a:rPr lang="en-US" b="1" dirty="0" smtClean="0"/>
+              <a:t>What did we learn?</a:t>
+            </a:r>
+          </a:p>
+          <a:p>
+            <a:pPr lvl="1"/>
+            <a:r>
+              <a:rPr lang="en-US" dirty="0" smtClean="0"/>
+              <a:t>How to use AngularJS</a:t>
+            </a:r>
+          </a:p>
+          <a:p>
+            <a:pPr lvl="1"/>
+            <a:r>
+              <a:rPr lang="en-US" dirty="0" smtClean="0"/>
+              <a:t>How to use </a:t>
+            </a:r>
+            <a:r>
+              <a:rPr lang="en-US" dirty="0" err="1" smtClean="0"/>
+              <a:t>SQLAlchemy</a:t>
+            </a:r>
+            <a:endParaRPr lang="en-US" dirty="0" smtClean="0"/>
+          </a:p>
+          <a:p>
+            <a:r>
+              <a:rPr lang="en-US" b="1" dirty="0" smtClean="0"/>
+              <a:t>What can we do better?</a:t>
+            </a:r>
+          </a:p>
+          <a:p>
+            <a:pPr lvl="1"/>
+            <a:r>
+              <a:rPr lang="en-US" dirty="0" smtClean="0"/>
+              <a:t>Not have all attributes as strings</a:t>
+            </a:r>
+          </a:p>
+          <a:p>
+            <a:pPr lvl="1"/>
+            <a:r>
+              <a:rPr lang="en-US" dirty="0" smtClean="0"/>
+              <a:t>Not include descriptions in </a:t>
+            </a:r>
+            <a:r>
+              <a:rPr lang="en-US" dirty="0" smtClean="0"/>
+              <a:t>search</a:t>
+            </a:r>
+          </a:p>
+          <a:p>
+            <a:pPr lvl="1"/>
+            <a:r>
+              <a:rPr lang="en-US" dirty="0" smtClean="0"/>
+              <a:t>Go back to same page when clicking on a model</a:t>
+            </a:r>
+            <a:endParaRPr lang="en-US" dirty="0" smtClean="0"/>
+          </a:p>
+          <a:p>
+            <a:r>
+              <a:rPr lang="en-US" b="1" dirty="0" smtClean="0"/>
+              <a:t>What puzzles us?</a:t>
+            </a:r>
+          </a:p>
+          <a:p>
+            <a:pPr lvl="1"/>
+            <a:r>
+              <a:rPr lang="en-US" dirty="0" smtClean="0"/>
+              <a:t>Docker</a:t>
+            </a:r>
+          </a:p>
+          <a:p>
+            <a:pPr lvl="1"/>
+            <a:r>
+              <a:rPr lang="en-US" dirty="0" smtClean="0"/>
+              <a:t>Search </a:t>
+            </a:r>
+            <a:r>
+              <a:rPr lang="en-US" dirty="0" smtClean="0"/>
+              <a:t>incompatibilities</a:t>
+            </a:r>
+            <a:endParaRPr lang="en-US" dirty="0" smtClean="0"/>
+          </a:p>
+        </p:txBody>
+      </p:sp>
+    </p:spTree>
+    <p:extLst>
+      <p:ext uri="{BB962C8B-B14F-4D97-AF65-F5344CB8AC3E}">
+        <p14:creationId xmlns:p14="http://schemas.microsoft.com/office/powerpoint/2010/main" val="1581070012"/>
+      </p:ext>
+    </p:extLst>
+  </p:cSld>
+  <p:clrMapOvr>
+    <a:masterClrMapping/>
+  </p:clrMapOvr>
+  <p:timing>
+    <p:tnLst>
+      <p:par>
+        <p:cTn id="1" dur="indefinite" restart="never" nodeType="tmRoot"/>
+      </p:par>
+    </p:tnLst>
+  </p:timing>
+</p:sld>
+</file>
+
+<file path=ppt/slides/slide12.xml><?xml version="1.0" encoding="utf-8"?>
+<p:sld xmlns:a="http://schemas.openxmlformats.org/drawingml/2006/main" xmlns:r="http://schemas.openxmlformats.org/officeDocument/2006/relationships" xmlns:p="http://schemas.openxmlformats.org/presentationml/2006/main">
+  <p:cSld>
+    <p:spTree>
+      <p:nvGrpSpPr>
+        <p:cNvPr id="1" name=""/>
+        <p:cNvGrpSpPr/>
+        <p:nvPr/>
+      </p:nvGrpSpPr>
+      <p:grpSpPr>
+        <a:xfrm>
+          <a:off x="0" y="0"/>
+          <a:ext cx="0" cy="0"/>
+          <a:chOff x="0" y="0"/>
+          <a:chExt cx="0" cy="0"/>
+        </a:xfrm>
+      </p:grpSpPr>
+      <p:sp>
+        <p:nvSpPr>
+          <p:cNvPr id="2" name="Title 1"/>
+          <p:cNvSpPr>
+            <a:spLocks noGrp="1"/>
+          </p:cNvSpPr>
+          <p:nvPr>
+            <p:ph type="title"/>
+          </p:nvPr>
+        </p:nvSpPr>
         <p:spPr/>
         <p:txBody>
+          <a:bodyPr/>
+          <a:lstStyle/>
+          <a:p>
+            <a:r>
+              <a:rPr lang="en-US" dirty="0" err="1" smtClean="0"/>
+              <a:t>ComPro</a:t>
+            </a:r>
+            <a:r>
+              <a:rPr lang="en-US" dirty="0" smtClean="0"/>
+              <a:t> </a:t>
+            </a:r>
+            <a:r>
+              <a:rPr lang="en-US" dirty="0" smtClean="0"/>
+              <a:t>DB Critique</a:t>
+            </a:r>
+            <a:endParaRPr lang="en-US" dirty="0"/>
+          </a:p>
+        </p:txBody>
+      </p:sp>
+      <p:sp>
+        <p:nvSpPr>
+          <p:cNvPr id="3" name="Content Placeholder 2"/>
+          <p:cNvSpPr>
+            <a:spLocks noGrp="1"/>
+          </p:cNvSpPr>
+          <p:nvPr>
+            <p:ph idx="1"/>
+          </p:nvPr>
+        </p:nvSpPr>
+        <p:spPr>
+          <a:xfrm>
+            <a:off x="1154954" y="2603500"/>
+            <a:ext cx="8825659" cy="3772248"/>
+          </a:xfrm>
+        </p:spPr>
+        <p:txBody>
           <a:bodyPr>
-            <a:normAutofit fontScale="92500" lnSpcReduction="10000"/>
+            <a:normAutofit fontScale="85000" lnSpcReduction="20000"/>
           </a:bodyPr>
           <a:lstStyle/>
           <a:p>
@@ -14573,7 +14711,18 @@
             <a:pPr lvl="1"/>
             <a:r>
               <a:rPr lang="en-US" dirty="0" smtClean="0"/>
-              <a:t>Clean design</a:t>
+              <a:t>Clean </a:t>
+            </a:r>
+            <a:r>
+              <a:rPr lang="en-US" dirty="0" smtClean="0"/>
+              <a:t>design</a:t>
+            </a:r>
+          </a:p>
+          <a:p>
+            <a:pPr lvl="1"/>
+            <a:r>
+              <a:rPr lang="en-US" dirty="0" smtClean="0"/>
+              <a:t>Easy to navigate</a:t>
             </a:r>
             <a:endParaRPr lang="en-US" dirty="0"/>
           </a:p>
@@ -14631,7 +14780,18 @@
             <a:pPr lvl="1"/>
             <a:r>
               <a:rPr lang="en-US" dirty="0" smtClean="0"/>
-              <a:t>Apiary wasn’t updated</a:t>
+              <a:t>Apiary wasn’t </a:t>
+            </a:r>
+            <a:r>
+              <a:rPr lang="en-US" dirty="0" smtClean="0"/>
+              <a:t>updated</a:t>
+            </a:r>
+          </a:p>
+          <a:p>
+            <a:pPr lvl="1"/>
+            <a:r>
+              <a:rPr lang="en-US" dirty="0" smtClean="0"/>
+              <a:t>More interesting UI</a:t>
             </a:r>
             <a:endParaRPr lang="en-US" dirty="0"/>
           </a:p>
@@ -14649,9 +14809,12 @@
             <a:pPr lvl="1"/>
             <a:r>
               <a:rPr lang="en-US" dirty="0" smtClean="0"/>
-              <a:t>Why does table loading stall sometimes?</a:t>
-            </a:r>
-            <a:endParaRPr lang="en-US" dirty="0"/>
+              <a:t>Why does table loading stall </a:t>
+            </a:r>
+            <a:r>
+              <a:rPr lang="en-US" dirty="0" smtClean="0"/>
+              <a:t>sometimes?</a:t>
+            </a:r>
           </a:p>
         </p:txBody>
       </p:sp>
@@ -14675,7 +14838,7 @@
 </p:sld>
 </file>
 
-<file path=ppt/slides/slide12.xml><?xml version="1.0" encoding="utf-8"?>
+<file path=ppt/slides/slide13.xml><?xml version="1.0" encoding="utf-8"?>
 <p:sld xmlns:a="http://schemas.openxmlformats.org/drawingml/2006/main" xmlns:r="http://schemas.openxmlformats.org/officeDocument/2006/relationships" xmlns:p="http://schemas.openxmlformats.org/presentationml/2006/main">
   <p:cSld>
     <p:spTree>
@@ -17046,7 +17209,7 @@
           <a:lstStyle/>
           <a:p>
             <a:r>
-              <a:rPr lang="en-US" dirty="0" err="1" smtClean="0">
+              <a:rPr lang="en-US" dirty="0" smtClean="0">
                 <a:hlinkClick r:id="rId2"/>
               </a:rPr>
               <a:t>www.swapi.co</a:t>
@@ -17056,16 +17219,50 @@
           <a:p>
             <a:pPr lvl="1"/>
             <a:r>
+              <a:rPr lang="en-US" dirty="0"/>
+              <a:t>Scraped basic data about each person, planet, &amp; species</a:t>
+            </a:r>
+          </a:p>
+          <a:p>
+            <a:pPr lvl="1"/>
+            <a:r>
+              <a:rPr lang="en-US" dirty="0"/>
+              <a:t>Also gave us misc. info: climate, hair color, height, gravity, </a:t>
+            </a:r>
+            <a:r>
               <a:rPr lang="en-US" dirty="0" smtClean="0"/>
-              <a:t>Scraped basic data about each person, planet, &amp; species</a:t>
-            </a:r>
+              <a:t>etc</a:t>
+            </a:r>
+            <a:r>
+              <a:rPr lang="en-US" dirty="0"/>
+              <a:t>.</a:t>
+            </a:r>
+            <a:endParaRPr lang="en-US" dirty="0" smtClean="0"/>
+          </a:p>
+          <a:p>
+            <a:r>
+              <a:rPr lang="en-US" dirty="0" err="1" smtClean="0"/>
+              <a:t>Wookieepedia</a:t>
+            </a:r>
+            <a:endParaRPr lang="en-US" dirty="0" smtClean="0"/>
           </a:p>
           <a:p>
             <a:pPr lvl="1"/>
             <a:r>
               <a:rPr lang="en-US" dirty="0" smtClean="0"/>
-              <a:t>Also gave us misc. info: climate, hair color, height, gravity, etc.</a:t>
-            </a:r>
+              <a:t>Intended to use their API, but we didn’t realize it was outdated and difficult to use</a:t>
+            </a:r>
+          </a:p>
+          <a:p>
+            <a:pPr lvl="1"/>
+            <a:r>
+              <a:rPr lang="en-US" dirty="0" smtClean="0"/>
+              <a:t>Manually scraped images and descriptions for each model and added to programmatically collected data</a:t>
+            </a:r>
+            <a:endParaRPr lang="en-US" dirty="0" smtClean="0"/>
+          </a:p>
+          <a:p>
+            <a:endParaRPr lang="en-US" dirty="0" smtClean="0"/>
           </a:p>
           <a:p>
             <a:pPr lvl="1"/>
@@ -17159,7 +17356,7 @@
         </p:spPr>
         <p:txBody>
           <a:bodyPr numCol="2" spcCol="1371600">
-            <a:normAutofit/>
+            <a:normAutofit fontScale="92500" lnSpcReduction="10000"/>
           </a:bodyPr>
           <a:lstStyle/>
           <a:p>
@@ -17201,8 +17398,70 @@
           <a:p>
             <a:r>
               <a:rPr lang="en-US" dirty="0" smtClean="0"/>
-              <a:t>/get_{person/planet/s}/{ID}</a:t>
-            </a:r>
+              <a:t>/</a:t>
+            </a:r>
+            <a:r>
+              <a:rPr lang="en-US" dirty="0" err="1" smtClean="0"/>
+              <a:t>get_person</a:t>
+            </a:r>
+            <a:r>
+              <a:rPr lang="en-US" dirty="0" smtClean="0"/>
+              <a:t>/{</a:t>
+            </a:r>
+            <a:r>
+              <a:rPr lang="en-US" dirty="0" smtClean="0"/>
+              <a:t>ID</a:t>
+            </a:r>
+            <a:r>
+              <a:rPr lang="en-US" dirty="0" smtClean="0"/>
+              <a:t>}</a:t>
+            </a:r>
+          </a:p>
+          <a:p>
+            <a:r>
+              <a:rPr lang="en-US" dirty="0"/>
+              <a:t>/</a:t>
+            </a:r>
+            <a:r>
+              <a:rPr lang="en-US" dirty="0" err="1" smtClean="0"/>
+              <a:t>get_planet</a:t>
+            </a:r>
+            <a:r>
+              <a:rPr lang="en-US" dirty="0" smtClean="0"/>
+              <a:t>/{</a:t>
+            </a:r>
+            <a:r>
+              <a:rPr lang="en-US" dirty="0"/>
+              <a:t>ID</a:t>
+            </a:r>
+            <a:r>
+              <a:rPr lang="en-US" dirty="0" smtClean="0"/>
+              <a:t>}</a:t>
+            </a:r>
+            <a:endParaRPr lang="en-US" dirty="0" smtClean="0"/>
+          </a:p>
+          <a:p>
+            <a:r>
+              <a:rPr lang="en-US" dirty="0"/>
+              <a:t>/</a:t>
+            </a:r>
+            <a:r>
+              <a:rPr lang="en-US" dirty="0" err="1" smtClean="0"/>
+              <a:t>get_s</a:t>
+            </a:r>
+            <a:r>
+              <a:rPr lang="en-US" dirty="0" smtClean="0"/>
+              <a:t>/{</a:t>
+            </a:r>
+            <a:r>
+              <a:rPr lang="en-US" dirty="0"/>
+              <a:t>ID</a:t>
+            </a:r>
+            <a:r>
+              <a:rPr lang="en-US" dirty="0" smtClean="0"/>
+              <a:t>}</a:t>
+            </a:r>
+            <a:endParaRPr lang="en-US" dirty="0" smtClean="0"/>
           </a:p>
           <a:p>
             <a:endParaRPr lang="en-US" dirty="0" smtClean="0"/>
@@ -17510,7 +17769,7 @@
         </p:nvSpPr>
         <p:spPr/>
         <p:txBody>
-          <a:bodyPr>
+          <a:bodyPr numCol="3">
             <a:normAutofit/>
           </a:bodyPr>
           <a:lstStyle/>
@@ -17559,9 +17818,106 @@
           <a:p>
             <a:pPr lvl="1"/>
             <a:r>
-              <a:rPr lang="en-US" sz="1800" dirty="0"/>
+              <a:rPr lang="en-US" sz="1800" dirty="0" smtClean="0"/>
               <a:t>Docker</a:t>
             </a:r>
+          </a:p>
+          <a:p>
+            <a:pPr lvl="1"/>
+            <a:endParaRPr lang="en-US" sz="1800" dirty="0"/>
+          </a:p>
+          <a:p>
+            <a:pPr lvl="1"/>
+            <a:r>
+              <a:rPr lang="en-US" sz="1800" dirty="0" smtClean="0"/>
+              <a:t>Hosting</a:t>
+            </a:r>
+          </a:p>
+          <a:p>
+            <a:pPr lvl="2"/>
+            <a:r>
+              <a:rPr lang="en-US" dirty="0" smtClean="0"/>
+              <a:t>Carina</a:t>
+            </a:r>
+          </a:p>
+          <a:p>
+            <a:pPr lvl="2"/>
+            <a:r>
+              <a:rPr lang="en-US" dirty="0" err="1" smtClean="0"/>
+              <a:t>Namecheap</a:t>
+            </a:r>
+            <a:endParaRPr lang="en-US" dirty="0" smtClean="0"/>
+          </a:p>
+          <a:p>
+            <a:pPr lvl="1"/>
+            <a:r>
+              <a:rPr lang="en-US" dirty="0" smtClean="0"/>
+              <a:t>Collaboration</a:t>
+            </a:r>
+          </a:p>
+          <a:p>
+            <a:pPr lvl="2"/>
+            <a:r>
+              <a:rPr lang="en-US" dirty="0" smtClean="0"/>
+              <a:t>GitHub</a:t>
+            </a:r>
+          </a:p>
+          <a:p>
+            <a:pPr lvl="2"/>
+            <a:r>
+              <a:rPr lang="en-US" dirty="0" smtClean="0"/>
+              <a:t>Slack</a:t>
+            </a:r>
+          </a:p>
+          <a:p>
+            <a:pPr lvl="1"/>
+            <a:r>
+              <a:rPr lang="en-US" dirty="0" smtClean="0"/>
+              <a:t>Continuous Integration</a:t>
+            </a:r>
+          </a:p>
+          <a:p>
+            <a:pPr lvl="2"/>
+            <a:r>
+              <a:rPr lang="en-US" dirty="0" smtClean="0"/>
+              <a:t>Travis CI</a:t>
+            </a:r>
+          </a:p>
+          <a:p>
+            <a:pPr lvl="2"/>
+            <a:endParaRPr lang="en-US" dirty="0"/>
+          </a:p>
+          <a:p>
+            <a:pPr lvl="1"/>
+            <a:r>
+              <a:rPr lang="en-US" dirty="0" smtClean="0"/>
+              <a:t>API</a:t>
+            </a:r>
+          </a:p>
+          <a:p>
+            <a:pPr lvl="2"/>
+            <a:r>
+              <a:rPr lang="en-US" dirty="0" smtClean="0"/>
+              <a:t>Apiary</a:t>
+            </a:r>
+          </a:p>
+          <a:p>
+            <a:pPr lvl="2"/>
+            <a:r>
+              <a:rPr lang="en-US" dirty="0" smtClean="0">
+                <a:hlinkClick r:id="rId2"/>
+              </a:rPr>
+              <a:t>www.swapi.co</a:t>
+            </a:r>
+            <a:endParaRPr lang="en-US" dirty="0" smtClean="0"/>
+          </a:p>
+          <a:p>
+            <a:pPr lvl="2"/>
+            <a:r>
+              <a:rPr lang="en-US" dirty="0" err="1" smtClean="0"/>
+              <a:t>Wookieepedia</a:t>
+            </a:r>
+            <a:endParaRPr lang="en-US" dirty="0" smtClean="0"/>
           </a:p>
         </p:txBody>
       </p:sp>
@@ -17625,45 +17981,52 @@
           </a:p>
         </p:txBody>
       </p:sp>
-      <p:graphicFrame>
-        <p:nvGraphicFramePr>
-          <p:cNvPr id="7" name="Chart 6"/>
-          <p:cNvGraphicFramePr/>
+      <p:sp>
+        <p:nvSpPr>
+          <p:cNvPr id="3" name="Content Placeholder 2"/>
+          <p:cNvSpPr>
+            <a:spLocks noGrp="1"/>
+          </p:cNvSpPr>
           <p:nvPr>
-            <p:extLst>
-              <p:ext uri="{D42A27DB-BD31-4B8C-83A1-F6EECF244321}">
-                <p14:modId xmlns:p14="http://schemas.microsoft.com/office/powerpoint/2010/main" val="2299011358"/>
-              </p:ext>
-            </p:extLst>
+            <p:ph idx="1"/>
           </p:nvPr>
-        </p:nvGraphicFramePr>
-        <p:xfrm>
-          <a:off x="1694767" y="2039930"/>
-          <a:ext cx="8886820" cy="4818070"/>
-        </p:xfrm>
-        <a:graphic>
-          <a:graphicData uri="http://schemas.openxmlformats.org/drawingml/2006/chart">
-            <c:chart xmlns:c="http://schemas.openxmlformats.org/drawingml/2006/chart" xmlns:r="http://schemas.openxmlformats.org/officeDocument/2006/relationships" r:id="rId2"/>
-          </a:graphicData>
-        </a:graphic>
-      </p:graphicFrame>
+        </p:nvSpPr>
+        <p:spPr/>
+        <p:txBody>
+          <a:bodyPr>
+            <a:normAutofit/>
+          </a:bodyPr>
+          <a:lstStyle/>
+          <a:p>
+            <a:r>
+              <a:rPr lang="en-US" sz="2800" dirty="0" smtClean="0"/>
+              <a:t>Commits: 263</a:t>
+            </a:r>
+          </a:p>
+          <a:p>
+            <a:r>
+              <a:rPr lang="en-US" sz="2800" dirty="0" smtClean="0"/>
+              <a:t>Issues: 50</a:t>
+            </a:r>
+          </a:p>
+          <a:p>
+            <a:r>
+              <a:rPr lang="en-US" sz="2800" dirty="0" smtClean="0"/>
+              <a:t>Unit Tests: 52</a:t>
+            </a:r>
+          </a:p>
+        </p:txBody>
+      </p:sp>
     </p:spTree>
     <p:extLst>
       <p:ext uri="{BB962C8B-B14F-4D97-AF65-F5344CB8AC3E}">
-        <p14:creationId xmlns:p14="http://schemas.microsoft.com/office/powerpoint/2010/main" val="1027931853"/>
+        <p14:creationId xmlns:p14="http://schemas.microsoft.com/office/powerpoint/2010/main" val="230730194"/>
       </p:ext>
     </p:extLst>
   </p:cSld>
   <p:clrMapOvr>
     <a:masterClrMapping/>
   </p:clrMapOvr>
-  <p:timing>
-    <p:tnLst>
-      <p:par>
-        <p:cTn id="1" dur="indefinite" restart="never" nodeType="tmRoot"/>
-      </p:par>
-    </p:tnLst>
-  </p:timing>
 </p:sld>
 </file>
 

</xml_diff>